<commit_message>
update ppt & data viz
</commit_message>
<xml_diff>
--- a/case-study/Report of Case Study_Adrian Maulana Muhammad.pptx
+++ b/case-study/Report of Case Study_Adrian Maulana Muhammad.pptx
@@ -7,7 +7,7 @@
     <p:sldMasterId id="2147483672" r:id="rId3"/>
   </p:sldMasterIdLst>
   <p:notesMasterIdLst>
-    <p:notesMasterId r:id="rId31"/>
+    <p:notesMasterId r:id="rId34"/>
   </p:notesMasterIdLst>
   <p:sldIdLst>
     <p:sldId id="256" r:id="rId4"/>
@@ -34,26 +34,29 @@
     <p:sldId id="298" r:id="rId25"/>
     <p:sldId id="288" r:id="rId26"/>
     <p:sldId id="266" r:id="rId27"/>
-    <p:sldId id="272" r:id="rId28"/>
-    <p:sldId id="273" r:id="rId29"/>
-    <p:sldId id="280" r:id="rId30"/>
+    <p:sldId id="300" r:id="rId28"/>
+    <p:sldId id="301" r:id="rId29"/>
+    <p:sldId id="302" r:id="rId30"/>
+    <p:sldId id="272" r:id="rId31"/>
+    <p:sldId id="273" r:id="rId32"/>
+    <p:sldId id="280" r:id="rId33"/>
   </p:sldIdLst>
   <p:sldSz cx="9144000" cy="5143500" type="screen16x9"/>
   <p:notesSz cx="6858000" cy="9144000"/>
   <p:embeddedFontLst>
     <p:embeddedFont>
       <p:font typeface="Consolas" panose="020B0609020204030204" pitchFamily="49" charset="0"/>
-      <p:regular r:id="rId32"/>
-      <p:bold r:id="rId33"/>
-      <p:italic r:id="rId34"/>
-      <p:boldItalic r:id="rId35"/>
+      <p:regular r:id="rId35"/>
+      <p:bold r:id="rId36"/>
+      <p:italic r:id="rId37"/>
+      <p:boldItalic r:id="rId38"/>
     </p:embeddedFont>
     <p:embeddedFont>
       <p:font typeface="Garamond" panose="02020404030301010803" pitchFamily="18" charset="0"/>
-      <p:regular r:id="rId36"/>
-      <p:bold r:id="rId37"/>
-      <p:italic r:id="rId38"/>
-      <p:boldItalic r:id="rId39"/>
+      <p:regular r:id="rId39"/>
+      <p:bold r:id="rId40"/>
+      <p:italic r:id="rId41"/>
+      <p:boldItalic r:id="rId42"/>
     </p:embeddedFont>
   </p:embeddedFontLst>
   <p:defaultTextStyle>
@@ -11327,7 +11330,7 @@
           <a:p>
             <a:fld id="{DF18388D-7049-4A58-ADEF-069566DE167C}" type="datetime1">
               <a:rPr lang="en-US" smtClean="0"/>
-              <a:t>1/29/2023</a:t>
+              <a:t>2/5/2023</a:t>
             </a:fld>
             <a:endParaRPr lang="en-US"/>
           </a:p>
@@ -11576,7 +11579,7 @@
           <a:p>
             <a:fld id="{2492679C-196D-4DE0-8A42-E5ADEB72970E}" type="datetime1">
               <a:rPr lang="en-US" smtClean="0"/>
-              <a:t>1/29/2023</a:t>
+              <a:t>2/5/2023</a:t>
             </a:fld>
             <a:endParaRPr lang="en-US"/>
           </a:p>
@@ -11854,7 +11857,7 @@
           <a:p>
             <a:fld id="{4374ED3D-CB9B-48CA-9D94-084D6089EB93}" type="datetime1">
               <a:rPr lang="en-US" smtClean="0"/>
-              <a:t>1/29/2023</a:t>
+              <a:t>2/5/2023</a:t>
             </a:fld>
             <a:endParaRPr lang="en-US"/>
           </a:p>
@@ -12122,7 +12125,7 @@
           <a:p>
             <a:fld id="{0B5689B3-530D-4855-BCB9-DEB09A7CF906}" type="datetime1">
               <a:rPr lang="en-US" smtClean="0"/>
-              <a:t>1/29/2023</a:t>
+              <a:t>2/5/2023</a:t>
             </a:fld>
             <a:endParaRPr lang="en-US"/>
           </a:p>
@@ -12537,7 +12540,7 @@
           <a:p>
             <a:fld id="{200FEFAF-07A3-4695-BB79-64B21819070B}" type="datetime1">
               <a:rPr lang="en-US" smtClean="0"/>
-              <a:t>1/29/2023</a:t>
+              <a:t>2/5/2023</a:t>
             </a:fld>
             <a:endParaRPr lang="en-US"/>
           </a:p>
@@ -12681,7 +12684,7 @@
           <a:p>
             <a:fld id="{1F283797-4250-4407-9785-E305430B2792}" type="datetime1">
               <a:rPr lang="en-US" smtClean="0"/>
-              <a:t>1/29/2023</a:t>
+              <a:t>2/5/2023</a:t>
             </a:fld>
             <a:endParaRPr lang="en-US"/>
           </a:p>
@@ -12797,7 +12800,7 @@
           <a:p>
             <a:fld id="{9EF207AB-517D-4491-9172-EBFFC880A0F5}" type="datetime1">
               <a:rPr lang="en-US" smtClean="0"/>
-              <a:t>1/29/2023</a:t>
+              <a:t>2/5/2023</a:t>
             </a:fld>
             <a:endParaRPr lang="en-US"/>
           </a:p>
@@ -13473,7 +13476,7 @@
           <a:p>
             <a:fld id="{49940FA8-FD76-4777-81F3-EA849AAF49D9}" type="datetime1">
               <a:rPr lang="en-US" smtClean="0"/>
-              <a:t>1/29/2023</a:t>
+              <a:t>2/5/2023</a:t>
             </a:fld>
             <a:endParaRPr lang="en-US"/>
           </a:p>
@@ -13764,7 +13767,7 @@
           <a:p>
             <a:fld id="{B2E5968D-F649-4BB4-A9DF-559D2CA7055F}" type="datetime1">
               <a:rPr lang="en-US" smtClean="0"/>
-              <a:t>1/29/2023</a:t>
+              <a:t>2/5/2023</a:t>
             </a:fld>
             <a:endParaRPr lang="en-US"/>
           </a:p>
@@ -13965,7 +13968,7 @@
           <a:p>
             <a:fld id="{A3E6A9BD-FB71-48D4-9715-A1838906E938}" type="datetime1">
               <a:rPr lang="en-US" smtClean="0"/>
-              <a:t>1/29/2023</a:t>
+              <a:t>2/5/2023</a:t>
             </a:fld>
             <a:endParaRPr lang="en-US"/>
           </a:p>
@@ -14176,7 +14179,7 @@
           <a:p>
             <a:fld id="{A156700E-BABF-48D7-91ED-16FA9F56B942}" type="datetime1">
               <a:rPr lang="en-US" smtClean="0"/>
-              <a:t>1/29/2023</a:t>
+              <a:t>2/5/2023</a:t>
             </a:fld>
             <a:endParaRPr lang="en-US"/>
           </a:p>
@@ -19459,7 +19462,7 @@
           <a:p>
             <a:fld id="{B63026A1-4838-47B3-BDB6-2E6C2423384E}" type="datetime1">
               <a:rPr lang="en-US" smtClean="0"/>
-              <a:t>1/29/2023</a:t>
+              <a:t>2/5/2023</a:t>
             </a:fld>
             <a:endParaRPr lang="en-US"/>
           </a:p>
@@ -32592,8 +32595,8 @@
         </p:nvSpPr>
         <p:spPr>
           <a:xfrm>
-            <a:off x="357188" y="498389"/>
-            <a:ext cx="3129768" cy="251736"/>
+            <a:off x="357188" y="290224"/>
+            <a:ext cx="3129767" cy="668068"/>
           </a:xfrm>
         </p:spPr>
         <p:txBody>
@@ -32602,11 +32605,14 @@
           </a:bodyPr>
           <a:lstStyle/>
           <a:p>
-            <a:endParaRPr lang="en-US" sz="1800" dirty="0">
-              <a:solidFill>
-                <a:schemeClr val="bg1"/>
-              </a:solidFill>
-            </a:endParaRPr>
+            <a:r>
+              <a:rPr lang="en-US" sz="2400" dirty="0">
+                <a:solidFill>
+                  <a:schemeClr val="bg1"/>
+                </a:solidFill>
+              </a:rPr>
+              <a:t>What category of items sold the most?</a:t>
+            </a:r>
           </a:p>
         </p:txBody>
       </p:sp>
@@ -32650,11 +32656,14 @@
               </a:spcAft>
               <a:buNone/>
             </a:pPr>
-            <a:endParaRPr lang="en-US" sz="1400" dirty="0">
-              <a:solidFill>
-                <a:schemeClr val="bg1"/>
-              </a:solidFill>
-            </a:endParaRPr>
+            <a:r>
+              <a:rPr lang="en-US" sz="1600" dirty="0">
+                <a:solidFill>
+                  <a:schemeClr val="bg1"/>
+                </a:solidFill>
+              </a:rPr>
+              <a:t>Based on the data visualization shown, it is evident that the product category which generated the highest revenue and sold the most units is Beverages, while the category with the lowest revenue is Seafood. The findings are aligned with the analysis of the Northwind database and provide valuable insights into the market performance of different product categories.</a:t>
+            </a:r>
           </a:p>
         </p:txBody>
       </p:sp>
@@ -32891,6 +32900,1294 @@
   <p:cSld>
     <p:spTree>
       <p:nvGrpSpPr>
+        <p:cNvPr id="1" name=""/>
+        <p:cNvGrpSpPr/>
+        <p:nvPr/>
+      </p:nvGrpSpPr>
+      <p:grpSpPr>
+        <a:xfrm>
+          <a:off x="0" y="0"/>
+          <a:ext cx="0" cy="0"/>
+          <a:chOff x="0" y="0"/>
+          <a:chExt cx="0" cy="0"/>
+        </a:xfrm>
+      </p:grpSpPr>
+      <p:sp>
+        <p:nvSpPr>
+          <p:cNvPr id="5" name="Rectangle 4">
+            <a:extLst>
+              <a:ext uri="{FF2B5EF4-FFF2-40B4-BE49-F238E27FC236}">
+                <a16:creationId xmlns:a16="http://schemas.microsoft.com/office/drawing/2014/main" id="{32DD081F-81B2-4DAF-B81A-01070A0AC9C3}"/>
+              </a:ext>
+            </a:extLst>
+          </p:cNvPr>
+          <p:cNvSpPr/>
+          <p:nvPr/>
+        </p:nvSpPr>
+        <p:spPr>
+          <a:xfrm>
+            <a:off x="0" y="0"/>
+            <a:ext cx="3960254" cy="5143495"/>
+          </a:xfrm>
+          <a:prstGeom prst="rect">
+            <a:avLst/>
+          </a:prstGeom>
+          <a:solidFill>
+            <a:srgbClr val="102747"/>
+          </a:solidFill>
+          <a:ln>
+            <a:noFill/>
+          </a:ln>
+        </p:spPr>
+        <p:style>
+          <a:lnRef idx="2">
+            <a:schemeClr val="accent1">
+              <a:shade val="50000"/>
+            </a:schemeClr>
+          </a:lnRef>
+          <a:fillRef idx="1">
+            <a:schemeClr val="accent1"/>
+          </a:fillRef>
+          <a:effectRef idx="0">
+            <a:schemeClr val="accent1"/>
+          </a:effectRef>
+          <a:fontRef idx="minor">
+            <a:schemeClr val="lt1"/>
+          </a:fontRef>
+        </p:style>
+        <p:txBody>
+          <a:bodyPr rtlCol="0" anchor="ctr"/>
+          <a:lstStyle/>
+          <a:p>
+            <a:pPr marL="0" marR="0" lvl="0" indent="0" algn="ctr" defTabSz="685800" rtl="0" eaLnBrk="1" fontAlgn="auto" latinLnBrk="0" hangingPunct="1">
+              <a:lnSpc>
+                <a:spcPct val="100000"/>
+              </a:lnSpc>
+              <a:spcBef>
+                <a:spcPts val="0"/>
+              </a:spcBef>
+              <a:spcAft>
+                <a:spcPts val="0"/>
+              </a:spcAft>
+              <a:buClrTx/>
+              <a:buSzTx/>
+              <a:buFont typeface="Arial"/>
+              <a:buNone/>
+              <a:tabLst/>
+              <a:defRPr/>
+            </a:pPr>
+            <a:endParaRPr kumimoji="0" lang="en-US" sz="1350" b="0" i="0" u="none" strike="noStrike" kern="1200" cap="none" spc="0" normalizeH="0" baseline="0" noProof="0">
+              <a:ln>
+                <a:noFill/>
+              </a:ln>
+              <a:solidFill>
+                <a:prstClr val="white"/>
+              </a:solidFill>
+              <a:effectLst/>
+              <a:uLnTx/>
+              <a:uFillTx/>
+              <a:latin typeface="Garamond"/>
+              <a:ea typeface="+mn-ea"/>
+              <a:cs typeface="+mn-cs"/>
+              <a:sym typeface="Arial"/>
+            </a:endParaRPr>
+          </a:p>
+        </p:txBody>
+      </p:sp>
+      <p:sp>
+        <p:nvSpPr>
+          <p:cNvPr id="2" name="Title 1">
+            <a:extLst>
+              <a:ext uri="{FF2B5EF4-FFF2-40B4-BE49-F238E27FC236}">
+                <a16:creationId xmlns:a16="http://schemas.microsoft.com/office/drawing/2014/main" id="{D019ADDA-F337-4788-86F1-266D5676F005}"/>
+              </a:ext>
+            </a:extLst>
+          </p:cNvPr>
+          <p:cNvSpPr>
+            <a:spLocks noGrp="1"/>
+          </p:cNvSpPr>
+          <p:nvPr>
+            <p:ph type="title"/>
+          </p:nvPr>
+        </p:nvSpPr>
+        <p:spPr>
+          <a:xfrm>
+            <a:off x="357188" y="290224"/>
+            <a:ext cx="3129767" cy="668068"/>
+          </a:xfrm>
+        </p:spPr>
+        <p:txBody>
+          <a:bodyPr vert="horz" wrap="square" lIns="0" tIns="0" rIns="0" bIns="0" rtlCol="0" anchor="ctr">
+            <a:spAutoFit/>
+          </a:bodyPr>
+          <a:lstStyle/>
+          <a:p>
+            <a:r>
+              <a:rPr lang="en-US" sz="2400" dirty="0">
+                <a:solidFill>
+                  <a:schemeClr val="bg1"/>
+                </a:solidFill>
+              </a:rPr>
+              <a:t>What is the best-selling product?</a:t>
+            </a:r>
+          </a:p>
+        </p:txBody>
+      </p:sp>
+      <p:sp>
+        <p:nvSpPr>
+          <p:cNvPr id="3" name="Content Placeholder 2">
+            <a:extLst>
+              <a:ext uri="{FF2B5EF4-FFF2-40B4-BE49-F238E27FC236}">
+                <a16:creationId xmlns:a16="http://schemas.microsoft.com/office/drawing/2014/main" id="{CCFEB3EB-D02A-4B2A-9829-29CDD5B66A36}"/>
+              </a:ext>
+            </a:extLst>
+          </p:cNvPr>
+          <p:cNvSpPr>
+            <a:spLocks noGrp="1"/>
+          </p:cNvSpPr>
+          <p:nvPr>
+            <p:ph idx="1"/>
+          </p:nvPr>
+        </p:nvSpPr>
+        <p:spPr>
+          <a:xfrm>
+            <a:off x="248555" y="1088572"/>
+            <a:ext cx="3463144" cy="3399257"/>
+          </a:xfrm>
+        </p:spPr>
+        <p:txBody>
+          <a:bodyPr vert="horz" lIns="0" tIns="0" rIns="0" bIns="0" rtlCol="0" anchor="t">
+            <a:noAutofit/>
+          </a:bodyPr>
+          <a:lstStyle/>
+          <a:p>
+            <a:pPr marL="0" indent="0" algn="just">
+              <a:lnSpc>
+                <a:spcPct val="100000"/>
+              </a:lnSpc>
+              <a:spcBef>
+                <a:spcPts val="0"/>
+              </a:spcBef>
+              <a:spcAft>
+                <a:spcPts val="900"/>
+              </a:spcAft>
+              <a:buNone/>
+            </a:pPr>
+            <a:r>
+              <a:rPr lang="en-US" sz="1600" dirty="0">
+                <a:solidFill>
+                  <a:schemeClr val="bg1"/>
+                </a:solidFill>
+              </a:rPr>
+              <a:t>Based on the data visualization displayed alongside, it is evident that the most highly sold product is Camembert Pierrot. Further analysis of the sales figures for this product indicates that it has consistently been one of the top-performing products within the Northwind inventory.</a:t>
+            </a:r>
+          </a:p>
+        </p:txBody>
+      </p:sp>
+      <p:sp>
+        <p:nvSpPr>
+          <p:cNvPr id="6" name="Slide Number Placeholder 5">
+            <a:extLst>
+              <a:ext uri="{FF2B5EF4-FFF2-40B4-BE49-F238E27FC236}">
+                <a16:creationId xmlns:a16="http://schemas.microsoft.com/office/drawing/2014/main" id="{CC019D98-9AE7-44E7-8F60-792F270F24EB}"/>
+              </a:ext>
+            </a:extLst>
+          </p:cNvPr>
+          <p:cNvSpPr>
+            <a:spLocks noGrp="1"/>
+          </p:cNvSpPr>
+          <p:nvPr>
+            <p:ph type="sldNum" sz="quarter" idx="12"/>
+          </p:nvPr>
+        </p:nvSpPr>
+        <p:spPr>
+          <a:xfrm>
+            <a:off x="8509716" y="4706541"/>
+            <a:ext cx="291385" cy="273844"/>
+          </a:xfrm>
+          <a:solidFill>
+            <a:srgbClr val="102747"/>
+          </a:solidFill>
+        </p:spPr>
+        <p:txBody>
+          <a:bodyPr/>
+          <a:lstStyle/>
+          <a:p>
+            <a:pPr marL="0" marR="0" lvl="0" indent="0" algn="ctr" defTabSz="685800" rtl="0" eaLnBrk="1" fontAlgn="auto" latinLnBrk="0" hangingPunct="1">
+              <a:lnSpc>
+                <a:spcPct val="100000"/>
+              </a:lnSpc>
+              <a:spcBef>
+                <a:spcPts val="0"/>
+              </a:spcBef>
+              <a:spcAft>
+                <a:spcPts val="0"/>
+              </a:spcAft>
+              <a:buClrTx/>
+              <a:buSzTx/>
+              <a:buFont typeface="Arial"/>
+              <a:buNone/>
+              <a:tabLst/>
+              <a:defRPr/>
+            </a:pPr>
+            <a:fld id="{20ACEE5B-6B89-47D3-A969-11CC9D54FA43}" type="slidenum">
+              <a:rPr kumimoji="0" lang="en-US" sz="900" b="0" i="0" u="none" strike="noStrike" kern="1200" cap="none" spc="0" normalizeH="0" baseline="0" noProof="0">
+                <a:ln>
+                  <a:noFill/>
+                </a:ln>
+                <a:solidFill>
+                  <a:prstClr val="white"/>
+                </a:solidFill>
+                <a:effectLst/>
+                <a:uLnTx/>
+                <a:uFillTx/>
+                <a:latin typeface="Garamond"/>
+                <a:ea typeface="+mn-ea"/>
+                <a:cs typeface="Arial"/>
+                <a:sym typeface="Arial"/>
+              </a:rPr>
+              <a:pPr marL="0" marR="0" lvl="0" indent="0" algn="ctr" defTabSz="685800" rtl="0" eaLnBrk="1" fontAlgn="auto" latinLnBrk="0" hangingPunct="1">
+                <a:lnSpc>
+                  <a:spcPct val="100000"/>
+                </a:lnSpc>
+                <a:spcBef>
+                  <a:spcPts val="0"/>
+                </a:spcBef>
+                <a:spcAft>
+                  <a:spcPts val="0"/>
+                </a:spcAft>
+                <a:buClrTx/>
+                <a:buSzTx/>
+                <a:buFont typeface="Arial"/>
+                <a:buNone/>
+                <a:tabLst/>
+                <a:defRPr/>
+              </a:pPr>
+              <a:t>25</a:t>
+            </a:fld>
+            <a:endParaRPr kumimoji="0" lang="en-US" sz="900" b="0" i="0" u="none" strike="noStrike" kern="1200" cap="none" spc="0" normalizeH="0" baseline="0" noProof="0">
+              <a:ln>
+                <a:noFill/>
+              </a:ln>
+              <a:solidFill>
+                <a:prstClr val="white"/>
+              </a:solidFill>
+              <a:effectLst/>
+              <a:uLnTx/>
+              <a:uFillTx/>
+              <a:latin typeface="Garamond"/>
+              <a:ea typeface="+mn-ea"/>
+              <a:cs typeface="Arial"/>
+              <a:sym typeface="Arial"/>
+            </a:endParaRPr>
+          </a:p>
+        </p:txBody>
+      </p:sp>
+      <p:cxnSp>
+        <p:nvCxnSpPr>
+          <p:cNvPr id="10" name="Straight Connector 9">
+            <a:extLst>
+              <a:ext uri="{FF2B5EF4-FFF2-40B4-BE49-F238E27FC236}">
+                <a16:creationId xmlns:a16="http://schemas.microsoft.com/office/drawing/2014/main" id="{FB636B81-E366-40A1-A22C-E23DE020F5B1}"/>
+              </a:ext>
+            </a:extLst>
+          </p:cNvPr>
+          <p:cNvCxnSpPr>
+            <a:cxnSpLocks/>
+          </p:cNvCxnSpPr>
+          <p:nvPr/>
+        </p:nvCxnSpPr>
+        <p:spPr>
+          <a:xfrm>
+            <a:off x="3960253" y="4843463"/>
+            <a:ext cx="4450322" cy="0"/>
+          </a:xfrm>
+          <a:prstGeom prst="line">
+            <a:avLst/>
+          </a:prstGeom>
+          <a:ln>
+            <a:solidFill>
+              <a:schemeClr val="bg1">
+                <a:lumMod val="75000"/>
+              </a:schemeClr>
+            </a:solidFill>
+          </a:ln>
+        </p:spPr>
+        <p:style>
+          <a:lnRef idx="1">
+            <a:schemeClr val="accent1"/>
+          </a:lnRef>
+          <a:fillRef idx="0">
+            <a:schemeClr val="accent1"/>
+          </a:fillRef>
+          <a:effectRef idx="0">
+            <a:schemeClr val="accent1"/>
+          </a:effectRef>
+          <a:fontRef idx="minor">
+            <a:schemeClr val="tx1"/>
+          </a:fontRef>
+        </p:style>
+      </p:cxnSp>
+      <p:cxnSp>
+        <p:nvCxnSpPr>
+          <p:cNvPr id="9" name="Straight Connector 8">
+            <a:extLst>
+              <a:ext uri="{FF2B5EF4-FFF2-40B4-BE49-F238E27FC236}">
+                <a16:creationId xmlns:a16="http://schemas.microsoft.com/office/drawing/2014/main" id="{C7FD908F-7DBA-4437-9681-9B15B002034C}"/>
+              </a:ext>
+            </a:extLst>
+          </p:cNvPr>
+          <p:cNvCxnSpPr>
+            <a:cxnSpLocks/>
+          </p:cNvCxnSpPr>
+          <p:nvPr/>
+        </p:nvCxnSpPr>
+        <p:spPr>
+          <a:xfrm>
+            <a:off x="357188" y="935191"/>
+            <a:ext cx="3129767" cy="0"/>
+          </a:xfrm>
+          <a:prstGeom prst="line">
+            <a:avLst/>
+          </a:prstGeom>
+          <a:ln>
+            <a:solidFill>
+              <a:schemeClr val="bg1"/>
+            </a:solidFill>
+          </a:ln>
+        </p:spPr>
+        <p:style>
+          <a:lnRef idx="1">
+            <a:schemeClr val="accent1"/>
+          </a:lnRef>
+          <a:fillRef idx="0">
+            <a:schemeClr val="accent1"/>
+          </a:fillRef>
+          <a:effectRef idx="0">
+            <a:schemeClr val="accent1"/>
+          </a:effectRef>
+          <a:fontRef idx="minor">
+            <a:schemeClr val="tx1"/>
+          </a:fontRef>
+        </p:style>
+      </p:cxnSp>
+      <p:pic>
+        <p:nvPicPr>
+          <p:cNvPr id="13" name="Picture 12">
+            <a:extLst>
+              <a:ext uri="{FF2B5EF4-FFF2-40B4-BE49-F238E27FC236}">
+                <a16:creationId xmlns:a16="http://schemas.microsoft.com/office/drawing/2014/main" id="{85200AD3-32FF-A1E5-B26A-7A5C93A82A97}"/>
+              </a:ext>
+            </a:extLst>
+          </p:cNvPr>
+          <p:cNvPicPr>
+            <a:picLocks noChangeAspect="1"/>
+          </p:cNvPicPr>
+          <p:nvPr/>
+        </p:nvPicPr>
+        <p:blipFill>
+          <a:blip r:embed="rId2"/>
+          <a:stretch>
+            <a:fillRect/>
+          </a:stretch>
+        </p:blipFill>
+        <p:spPr>
+          <a:xfrm>
+            <a:off x="4511855" y="624258"/>
+            <a:ext cx="3997861" cy="3965424"/>
+          </a:xfrm>
+          <a:prstGeom prst="rect">
+            <a:avLst/>
+          </a:prstGeom>
+          <a:ln>
+            <a:solidFill>
+              <a:schemeClr val="tx1"/>
+            </a:solidFill>
+          </a:ln>
+        </p:spPr>
+      </p:pic>
+    </p:spTree>
+    <p:extLst>
+      <p:ext uri="{BB962C8B-B14F-4D97-AF65-F5344CB8AC3E}">
+        <p14:creationId xmlns:p14="http://schemas.microsoft.com/office/powerpoint/2010/main" val="3651930683"/>
+      </p:ext>
+    </p:extLst>
+  </p:cSld>
+  <p:clrMapOvr>
+    <a:masterClrMapping/>
+  </p:clrMapOvr>
+</p:sld>
+</file>
+
+<file path=ppt/slides/slide26.xml><?xml version="1.0" encoding="utf-8"?>
+<p:sld xmlns:a="http://schemas.openxmlformats.org/drawingml/2006/main" xmlns:r="http://schemas.openxmlformats.org/officeDocument/2006/relationships" xmlns:p="http://schemas.openxmlformats.org/presentationml/2006/main">
+  <p:cSld>
+    <p:spTree>
+      <p:nvGrpSpPr>
+        <p:cNvPr id="1" name=""/>
+        <p:cNvGrpSpPr/>
+        <p:nvPr/>
+      </p:nvGrpSpPr>
+      <p:grpSpPr>
+        <a:xfrm>
+          <a:off x="0" y="0"/>
+          <a:ext cx="0" cy="0"/>
+          <a:chOff x="0" y="0"/>
+          <a:chExt cx="0" cy="0"/>
+        </a:xfrm>
+      </p:grpSpPr>
+      <p:sp>
+        <p:nvSpPr>
+          <p:cNvPr id="5" name="Rectangle 4">
+            <a:extLst>
+              <a:ext uri="{FF2B5EF4-FFF2-40B4-BE49-F238E27FC236}">
+                <a16:creationId xmlns:a16="http://schemas.microsoft.com/office/drawing/2014/main" id="{32DD081F-81B2-4DAF-B81A-01070A0AC9C3}"/>
+              </a:ext>
+            </a:extLst>
+          </p:cNvPr>
+          <p:cNvSpPr/>
+          <p:nvPr/>
+        </p:nvSpPr>
+        <p:spPr>
+          <a:xfrm>
+            <a:off x="0" y="0"/>
+            <a:ext cx="3960254" cy="5143495"/>
+          </a:xfrm>
+          <a:prstGeom prst="rect">
+            <a:avLst/>
+          </a:prstGeom>
+          <a:solidFill>
+            <a:srgbClr val="102747"/>
+          </a:solidFill>
+          <a:ln>
+            <a:noFill/>
+          </a:ln>
+        </p:spPr>
+        <p:style>
+          <a:lnRef idx="2">
+            <a:schemeClr val="accent1">
+              <a:shade val="50000"/>
+            </a:schemeClr>
+          </a:lnRef>
+          <a:fillRef idx="1">
+            <a:schemeClr val="accent1"/>
+          </a:fillRef>
+          <a:effectRef idx="0">
+            <a:schemeClr val="accent1"/>
+          </a:effectRef>
+          <a:fontRef idx="minor">
+            <a:schemeClr val="lt1"/>
+          </a:fontRef>
+        </p:style>
+        <p:txBody>
+          <a:bodyPr rtlCol="0" anchor="ctr"/>
+          <a:lstStyle/>
+          <a:p>
+            <a:pPr marL="0" marR="0" lvl="0" indent="0" algn="ctr" defTabSz="685800" rtl="0" eaLnBrk="1" fontAlgn="auto" latinLnBrk="0" hangingPunct="1">
+              <a:lnSpc>
+                <a:spcPct val="100000"/>
+              </a:lnSpc>
+              <a:spcBef>
+                <a:spcPts val="0"/>
+              </a:spcBef>
+              <a:spcAft>
+                <a:spcPts val="0"/>
+              </a:spcAft>
+              <a:buClrTx/>
+              <a:buSzTx/>
+              <a:buFont typeface="Arial"/>
+              <a:buNone/>
+              <a:tabLst/>
+              <a:defRPr/>
+            </a:pPr>
+            <a:endParaRPr kumimoji="0" lang="en-US" sz="1350" b="0" i="0" u="none" strike="noStrike" kern="1200" cap="none" spc="0" normalizeH="0" baseline="0" noProof="0">
+              <a:ln>
+                <a:noFill/>
+              </a:ln>
+              <a:solidFill>
+                <a:prstClr val="white"/>
+              </a:solidFill>
+              <a:effectLst/>
+              <a:uLnTx/>
+              <a:uFillTx/>
+              <a:latin typeface="Garamond"/>
+              <a:ea typeface="+mn-ea"/>
+              <a:cs typeface="+mn-cs"/>
+              <a:sym typeface="Arial"/>
+            </a:endParaRPr>
+          </a:p>
+        </p:txBody>
+      </p:sp>
+      <p:sp>
+        <p:nvSpPr>
+          <p:cNvPr id="2" name="Title 1">
+            <a:extLst>
+              <a:ext uri="{FF2B5EF4-FFF2-40B4-BE49-F238E27FC236}">
+                <a16:creationId xmlns:a16="http://schemas.microsoft.com/office/drawing/2014/main" id="{D019ADDA-F337-4788-86F1-266D5676F005}"/>
+              </a:ext>
+            </a:extLst>
+          </p:cNvPr>
+          <p:cNvSpPr>
+            <a:spLocks noGrp="1"/>
+          </p:cNvSpPr>
+          <p:nvPr>
+            <p:ph type="title"/>
+          </p:nvPr>
+        </p:nvSpPr>
+        <p:spPr>
+          <a:xfrm>
+            <a:off x="357188" y="290224"/>
+            <a:ext cx="3129767" cy="668068"/>
+          </a:xfrm>
+        </p:spPr>
+        <p:txBody>
+          <a:bodyPr vert="horz" wrap="square" lIns="0" tIns="0" rIns="0" bIns="0" rtlCol="0" anchor="ctr">
+            <a:spAutoFit/>
+          </a:bodyPr>
+          <a:lstStyle/>
+          <a:p>
+            <a:r>
+              <a:rPr lang="en-US" sz="2400" dirty="0">
+                <a:solidFill>
+                  <a:schemeClr val="bg1"/>
+                </a:solidFill>
+              </a:rPr>
+              <a:t>From which country do the customers originate?</a:t>
+            </a:r>
+          </a:p>
+        </p:txBody>
+      </p:sp>
+      <p:sp>
+        <p:nvSpPr>
+          <p:cNvPr id="3" name="Content Placeholder 2">
+            <a:extLst>
+              <a:ext uri="{FF2B5EF4-FFF2-40B4-BE49-F238E27FC236}">
+                <a16:creationId xmlns:a16="http://schemas.microsoft.com/office/drawing/2014/main" id="{CCFEB3EB-D02A-4B2A-9829-29CDD5B66A36}"/>
+              </a:ext>
+            </a:extLst>
+          </p:cNvPr>
+          <p:cNvSpPr>
+            <a:spLocks noGrp="1"/>
+          </p:cNvSpPr>
+          <p:nvPr>
+            <p:ph idx="1"/>
+          </p:nvPr>
+        </p:nvSpPr>
+        <p:spPr>
+          <a:xfrm>
+            <a:off x="244680" y="1088572"/>
+            <a:ext cx="3470893" cy="3399257"/>
+          </a:xfrm>
+        </p:spPr>
+        <p:txBody>
+          <a:bodyPr vert="horz" lIns="0" tIns="0" rIns="0" bIns="0" rtlCol="0" anchor="t">
+            <a:noAutofit/>
+          </a:bodyPr>
+          <a:lstStyle/>
+          <a:p>
+            <a:pPr marL="0" indent="0" algn="just">
+              <a:lnSpc>
+                <a:spcPct val="100000"/>
+              </a:lnSpc>
+              <a:spcBef>
+                <a:spcPts val="0"/>
+              </a:spcBef>
+              <a:spcAft>
+                <a:spcPts val="900"/>
+              </a:spcAft>
+              <a:buNone/>
+            </a:pPr>
+            <a:r>
+              <a:rPr lang="en-US" sz="1600" dirty="0">
+                <a:solidFill>
+                  <a:schemeClr val="bg1"/>
+                </a:solidFill>
+              </a:rPr>
+              <a:t>Based on the visualization data displayed, it is evident that most customers are located in the United States, while the least amount of customers is from France. This can provide valuable insights into the geographical distribution of the customer base and can be used to inform future business strategies and marketing efforts.</a:t>
+            </a:r>
+          </a:p>
+        </p:txBody>
+      </p:sp>
+      <p:sp>
+        <p:nvSpPr>
+          <p:cNvPr id="6" name="Slide Number Placeholder 5">
+            <a:extLst>
+              <a:ext uri="{FF2B5EF4-FFF2-40B4-BE49-F238E27FC236}">
+                <a16:creationId xmlns:a16="http://schemas.microsoft.com/office/drawing/2014/main" id="{CC019D98-9AE7-44E7-8F60-792F270F24EB}"/>
+              </a:ext>
+            </a:extLst>
+          </p:cNvPr>
+          <p:cNvSpPr>
+            <a:spLocks noGrp="1"/>
+          </p:cNvSpPr>
+          <p:nvPr>
+            <p:ph type="sldNum" sz="quarter" idx="12"/>
+          </p:nvPr>
+        </p:nvSpPr>
+        <p:spPr>
+          <a:xfrm>
+            <a:off x="8509716" y="4706541"/>
+            <a:ext cx="291385" cy="273844"/>
+          </a:xfrm>
+          <a:solidFill>
+            <a:srgbClr val="102747"/>
+          </a:solidFill>
+        </p:spPr>
+        <p:txBody>
+          <a:bodyPr/>
+          <a:lstStyle/>
+          <a:p>
+            <a:pPr marL="0" marR="0" lvl="0" indent="0" algn="ctr" defTabSz="685800" rtl="0" eaLnBrk="1" fontAlgn="auto" latinLnBrk="0" hangingPunct="1">
+              <a:lnSpc>
+                <a:spcPct val="100000"/>
+              </a:lnSpc>
+              <a:spcBef>
+                <a:spcPts val="0"/>
+              </a:spcBef>
+              <a:spcAft>
+                <a:spcPts val="0"/>
+              </a:spcAft>
+              <a:buClrTx/>
+              <a:buSzTx/>
+              <a:buFont typeface="Arial"/>
+              <a:buNone/>
+              <a:tabLst/>
+              <a:defRPr/>
+            </a:pPr>
+            <a:fld id="{20ACEE5B-6B89-47D3-A969-11CC9D54FA43}" type="slidenum">
+              <a:rPr kumimoji="0" lang="en-US" sz="900" b="0" i="0" u="none" strike="noStrike" kern="1200" cap="none" spc="0" normalizeH="0" baseline="0" noProof="0">
+                <a:ln>
+                  <a:noFill/>
+                </a:ln>
+                <a:solidFill>
+                  <a:prstClr val="white"/>
+                </a:solidFill>
+                <a:effectLst/>
+                <a:uLnTx/>
+                <a:uFillTx/>
+                <a:latin typeface="Garamond"/>
+                <a:ea typeface="+mn-ea"/>
+                <a:cs typeface="Arial"/>
+                <a:sym typeface="Arial"/>
+              </a:rPr>
+              <a:pPr marL="0" marR="0" lvl="0" indent="0" algn="ctr" defTabSz="685800" rtl="0" eaLnBrk="1" fontAlgn="auto" latinLnBrk="0" hangingPunct="1">
+                <a:lnSpc>
+                  <a:spcPct val="100000"/>
+                </a:lnSpc>
+                <a:spcBef>
+                  <a:spcPts val="0"/>
+                </a:spcBef>
+                <a:spcAft>
+                  <a:spcPts val="0"/>
+                </a:spcAft>
+                <a:buClrTx/>
+                <a:buSzTx/>
+                <a:buFont typeface="Arial"/>
+                <a:buNone/>
+                <a:tabLst/>
+                <a:defRPr/>
+              </a:pPr>
+              <a:t>26</a:t>
+            </a:fld>
+            <a:endParaRPr kumimoji="0" lang="en-US" sz="900" b="0" i="0" u="none" strike="noStrike" kern="1200" cap="none" spc="0" normalizeH="0" baseline="0" noProof="0">
+              <a:ln>
+                <a:noFill/>
+              </a:ln>
+              <a:solidFill>
+                <a:prstClr val="white"/>
+              </a:solidFill>
+              <a:effectLst/>
+              <a:uLnTx/>
+              <a:uFillTx/>
+              <a:latin typeface="Garamond"/>
+              <a:ea typeface="+mn-ea"/>
+              <a:cs typeface="Arial"/>
+              <a:sym typeface="Arial"/>
+            </a:endParaRPr>
+          </a:p>
+        </p:txBody>
+      </p:sp>
+      <p:cxnSp>
+        <p:nvCxnSpPr>
+          <p:cNvPr id="10" name="Straight Connector 9">
+            <a:extLst>
+              <a:ext uri="{FF2B5EF4-FFF2-40B4-BE49-F238E27FC236}">
+                <a16:creationId xmlns:a16="http://schemas.microsoft.com/office/drawing/2014/main" id="{FB636B81-E366-40A1-A22C-E23DE020F5B1}"/>
+              </a:ext>
+            </a:extLst>
+          </p:cNvPr>
+          <p:cNvCxnSpPr>
+            <a:cxnSpLocks/>
+          </p:cNvCxnSpPr>
+          <p:nvPr/>
+        </p:nvCxnSpPr>
+        <p:spPr>
+          <a:xfrm>
+            <a:off x="3960253" y="4843463"/>
+            <a:ext cx="4450322" cy="0"/>
+          </a:xfrm>
+          <a:prstGeom prst="line">
+            <a:avLst/>
+          </a:prstGeom>
+          <a:ln>
+            <a:solidFill>
+              <a:schemeClr val="bg1">
+                <a:lumMod val="75000"/>
+              </a:schemeClr>
+            </a:solidFill>
+          </a:ln>
+        </p:spPr>
+        <p:style>
+          <a:lnRef idx="1">
+            <a:schemeClr val="accent1"/>
+          </a:lnRef>
+          <a:fillRef idx="0">
+            <a:schemeClr val="accent1"/>
+          </a:fillRef>
+          <a:effectRef idx="0">
+            <a:schemeClr val="accent1"/>
+          </a:effectRef>
+          <a:fontRef idx="minor">
+            <a:schemeClr val="tx1"/>
+          </a:fontRef>
+        </p:style>
+      </p:cxnSp>
+      <p:cxnSp>
+        <p:nvCxnSpPr>
+          <p:cNvPr id="9" name="Straight Connector 8">
+            <a:extLst>
+              <a:ext uri="{FF2B5EF4-FFF2-40B4-BE49-F238E27FC236}">
+                <a16:creationId xmlns:a16="http://schemas.microsoft.com/office/drawing/2014/main" id="{C7FD908F-7DBA-4437-9681-9B15B002034C}"/>
+              </a:ext>
+            </a:extLst>
+          </p:cNvPr>
+          <p:cNvCxnSpPr>
+            <a:cxnSpLocks/>
+          </p:cNvCxnSpPr>
+          <p:nvPr/>
+        </p:nvCxnSpPr>
+        <p:spPr>
+          <a:xfrm>
+            <a:off x="357188" y="935191"/>
+            <a:ext cx="3129767" cy="0"/>
+          </a:xfrm>
+          <a:prstGeom prst="line">
+            <a:avLst/>
+          </a:prstGeom>
+          <a:ln>
+            <a:solidFill>
+              <a:schemeClr val="bg1"/>
+            </a:solidFill>
+          </a:ln>
+        </p:spPr>
+        <p:style>
+          <a:lnRef idx="1">
+            <a:schemeClr val="accent1"/>
+          </a:lnRef>
+          <a:fillRef idx="0">
+            <a:schemeClr val="accent1"/>
+          </a:fillRef>
+          <a:effectRef idx="0">
+            <a:schemeClr val="accent1"/>
+          </a:effectRef>
+          <a:fontRef idx="minor">
+            <a:schemeClr val="tx1"/>
+          </a:fontRef>
+        </p:style>
+      </p:cxnSp>
+      <p:pic>
+        <p:nvPicPr>
+          <p:cNvPr id="12" name="Picture 11">
+            <a:extLst>
+              <a:ext uri="{FF2B5EF4-FFF2-40B4-BE49-F238E27FC236}">
+                <a16:creationId xmlns:a16="http://schemas.microsoft.com/office/drawing/2014/main" id="{CBBE8C97-F355-9DB0-1872-708DE64F1905}"/>
+              </a:ext>
+            </a:extLst>
+          </p:cNvPr>
+          <p:cNvPicPr>
+            <a:picLocks noChangeAspect="1"/>
+          </p:cNvPicPr>
+          <p:nvPr/>
+        </p:nvPicPr>
+        <p:blipFill>
+          <a:blip r:embed="rId2"/>
+          <a:stretch>
+            <a:fillRect/>
+          </a:stretch>
+        </p:blipFill>
+        <p:spPr>
+          <a:xfrm>
+            <a:off x="4645383" y="719134"/>
+            <a:ext cx="4010025" cy="3705225"/>
+          </a:xfrm>
+          <a:prstGeom prst="rect">
+            <a:avLst/>
+          </a:prstGeom>
+          <a:ln>
+            <a:solidFill>
+              <a:schemeClr val="tx1"/>
+            </a:solidFill>
+          </a:ln>
+        </p:spPr>
+      </p:pic>
+    </p:spTree>
+    <p:extLst>
+      <p:ext uri="{BB962C8B-B14F-4D97-AF65-F5344CB8AC3E}">
+        <p14:creationId xmlns:p14="http://schemas.microsoft.com/office/powerpoint/2010/main" val="1966798396"/>
+      </p:ext>
+    </p:extLst>
+  </p:cSld>
+  <p:clrMapOvr>
+    <a:masterClrMapping/>
+  </p:clrMapOvr>
+</p:sld>
+</file>
+
+<file path=ppt/slides/slide27.xml><?xml version="1.0" encoding="utf-8"?>
+<p:sld xmlns:a="http://schemas.openxmlformats.org/drawingml/2006/main" xmlns:r="http://schemas.openxmlformats.org/officeDocument/2006/relationships" xmlns:p="http://schemas.openxmlformats.org/presentationml/2006/main">
+  <p:cSld>
+    <p:spTree>
+      <p:nvGrpSpPr>
+        <p:cNvPr id="1" name=""/>
+        <p:cNvGrpSpPr/>
+        <p:nvPr/>
+      </p:nvGrpSpPr>
+      <p:grpSpPr>
+        <a:xfrm>
+          <a:off x="0" y="0"/>
+          <a:ext cx="0" cy="0"/>
+          <a:chOff x="0" y="0"/>
+          <a:chExt cx="0" cy="0"/>
+        </a:xfrm>
+      </p:grpSpPr>
+      <p:sp>
+        <p:nvSpPr>
+          <p:cNvPr id="5" name="Rectangle 4">
+            <a:extLst>
+              <a:ext uri="{FF2B5EF4-FFF2-40B4-BE49-F238E27FC236}">
+                <a16:creationId xmlns:a16="http://schemas.microsoft.com/office/drawing/2014/main" id="{32DD081F-81B2-4DAF-B81A-01070A0AC9C3}"/>
+              </a:ext>
+            </a:extLst>
+          </p:cNvPr>
+          <p:cNvSpPr/>
+          <p:nvPr/>
+        </p:nvSpPr>
+        <p:spPr>
+          <a:xfrm>
+            <a:off x="0" y="0"/>
+            <a:ext cx="3960254" cy="5143495"/>
+          </a:xfrm>
+          <a:prstGeom prst="rect">
+            <a:avLst/>
+          </a:prstGeom>
+          <a:solidFill>
+            <a:srgbClr val="102747"/>
+          </a:solidFill>
+          <a:ln>
+            <a:noFill/>
+          </a:ln>
+        </p:spPr>
+        <p:style>
+          <a:lnRef idx="2">
+            <a:schemeClr val="accent1">
+              <a:shade val="50000"/>
+            </a:schemeClr>
+          </a:lnRef>
+          <a:fillRef idx="1">
+            <a:schemeClr val="accent1"/>
+          </a:fillRef>
+          <a:effectRef idx="0">
+            <a:schemeClr val="accent1"/>
+          </a:effectRef>
+          <a:fontRef idx="minor">
+            <a:schemeClr val="lt1"/>
+          </a:fontRef>
+        </p:style>
+        <p:txBody>
+          <a:bodyPr rtlCol="0" anchor="ctr"/>
+          <a:lstStyle/>
+          <a:p>
+            <a:pPr marL="0" marR="0" lvl="0" indent="0" algn="ctr" defTabSz="685800" rtl="0" eaLnBrk="1" fontAlgn="auto" latinLnBrk="0" hangingPunct="1">
+              <a:lnSpc>
+                <a:spcPct val="100000"/>
+              </a:lnSpc>
+              <a:spcBef>
+                <a:spcPts val="0"/>
+              </a:spcBef>
+              <a:spcAft>
+                <a:spcPts val="0"/>
+              </a:spcAft>
+              <a:buClrTx/>
+              <a:buSzTx/>
+              <a:buFont typeface="Arial"/>
+              <a:buNone/>
+              <a:tabLst/>
+              <a:defRPr/>
+            </a:pPr>
+            <a:endParaRPr kumimoji="0" lang="en-US" sz="1350" b="0" i="0" u="none" strike="noStrike" kern="1200" cap="none" spc="0" normalizeH="0" baseline="0" noProof="0">
+              <a:ln>
+                <a:noFill/>
+              </a:ln>
+              <a:solidFill>
+                <a:prstClr val="white"/>
+              </a:solidFill>
+              <a:effectLst/>
+              <a:uLnTx/>
+              <a:uFillTx/>
+              <a:latin typeface="Garamond"/>
+              <a:ea typeface="+mn-ea"/>
+              <a:cs typeface="+mn-cs"/>
+              <a:sym typeface="Arial"/>
+            </a:endParaRPr>
+          </a:p>
+        </p:txBody>
+      </p:sp>
+      <p:sp>
+        <p:nvSpPr>
+          <p:cNvPr id="2" name="Title 1">
+            <a:extLst>
+              <a:ext uri="{FF2B5EF4-FFF2-40B4-BE49-F238E27FC236}">
+                <a16:creationId xmlns:a16="http://schemas.microsoft.com/office/drawing/2014/main" id="{D019ADDA-F337-4788-86F1-266D5676F005}"/>
+              </a:ext>
+            </a:extLst>
+          </p:cNvPr>
+          <p:cNvSpPr>
+            <a:spLocks noGrp="1"/>
+          </p:cNvSpPr>
+          <p:nvPr>
+            <p:ph type="title"/>
+          </p:nvPr>
+        </p:nvSpPr>
+        <p:spPr>
+          <a:xfrm>
+            <a:off x="357188" y="290224"/>
+            <a:ext cx="3129767" cy="668068"/>
+          </a:xfrm>
+        </p:spPr>
+        <p:txBody>
+          <a:bodyPr vert="horz" wrap="square" lIns="0" tIns="0" rIns="0" bIns="0" rtlCol="0" anchor="ctr">
+            <a:spAutoFit/>
+          </a:bodyPr>
+          <a:lstStyle/>
+          <a:p>
+            <a:r>
+              <a:rPr lang="en-US" sz="2400" dirty="0">
+                <a:solidFill>
+                  <a:schemeClr val="bg1"/>
+                </a:solidFill>
+              </a:rPr>
+              <a:t>Which company places the most orders?</a:t>
+            </a:r>
+          </a:p>
+        </p:txBody>
+      </p:sp>
+      <p:sp>
+        <p:nvSpPr>
+          <p:cNvPr id="3" name="Content Placeholder 2">
+            <a:extLst>
+              <a:ext uri="{FF2B5EF4-FFF2-40B4-BE49-F238E27FC236}">
+                <a16:creationId xmlns:a16="http://schemas.microsoft.com/office/drawing/2014/main" id="{CCFEB3EB-D02A-4B2A-9829-29CDD5B66A36}"/>
+              </a:ext>
+            </a:extLst>
+          </p:cNvPr>
+          <p:cNvSpPr>
+            <a:spLocks noGrp="1"/>
+          </p:cNvSpPr>
+          <p:nvPr>
+            <p:ph idx="1"/>
+          </p:nvPr>
+        </p:nvSpPr>
+        <p:spPr>
+          <a:xfrm>
+            <a:off x="248555" y="1088572"/>
+            <a:ext cx="3424543" cy="3399257"/>
+          </a:xfrm>
+        </p:spPr>
+        <p:txBody>
+          <a:bodyPr vert="horz" lIns="0" tIns="0" rIns="0" bIns="0" rtlCol="0" anchor="t">
+            <a:noAutofit/>
+          </a:bodyPr>
+          <a:lstStyle/>
+          <a:p>
+            <a:pPr marL="0" indent="0" algn="just">
+              <a:lnSpc>
+                <a:spcPct val="100000"/>
+              </a:lnSpc>
+              <a:spcBef>
+                <a:spcPts val="0"/>
+              </a:spcBef>
+              <a:spcAft>
+                <a:spcPts val="900"/>
+              </a:spcAft>
+              <a:buNone/>
+            </a:pPr>
+            <a:r>
+              <a:rPr lang="en-US" sz="1600" dirty="0">
+                <a:solidFill>
+                  <a:schemeClr val="bg1"/>
+                </a:solidFill>
+              </a:rPr>
+              <a:t>Based on the visualization data shown alongside, it can be seen that the company that places the most orders is Save-a-lot Markets, and the company that places the least orders is </a:t>
+            </a:r>
+            <a:r>
+              <a:rPr lang="en-US" sz="1600" dirty="0" err="1">
+                <a:solidFill>
+                  <a:schemeClr val="bg1"/>
+                </a:solidFill>
+              </a:rPr>
+              <a:t>Frankenversand</a:t>
+            </a:r>
+            <a:r>
+              <a:rPr lang="en-US" sz="1600" dirty="0">
+                <a:solidFill>
+                  <a:schemeClr val="bg1"/>
+                </a:solidFill>
+              </a:rPr>
+              <a:t>. The insights gleaned from this analysis are indicative of the purchasing patterns of different companies and could provide valuable information for businesses looking to optimize their sales and marketing strategies.</a:t>
+            </a:r>
+          </a:p>
+        </p:txBody>
+      </p:sp>
+      <p:sp>
+        <p:nvSpPr>
+          <p:cNvPr id="6" name="Slide Number Placeholder 5">
+            <a:extLst>
+              <a:ext uri="{FF2B5EF4-FFF2-40B4-BE49-F238E27FC236}">
+                <a16:creationId xmlns:a16="http://schemas.microsoft.com/office/drawing/2014/main" id="{CC019D98-9AE7-44E7-8F60-792F270F24EB}"/>
+              </a:ext>
+            </a:extLst>
+          </p:cNvPr>
+          <p:cNvSpPr>
+            <a:spLocks noGrp="1"/>
+          </p:cNvSpPr>
+          <p:nvPr>
+            <p:ph type="sldNum" sz="quarter" idx="12"/>
+          </p:nvPr>
+        </p:nvSpPr>
+        <p:spPr>
+          <a:xfrm>
+            <a:off x="8509716" y="4706541"/>
+            <a:ext cx="291385" cy="273844"/>
+          </a:xfrm>
+          <a:solidFill>
+            <a:srgbClr val="102747"/>
+          </a:solidFill>
+        </p:spPr>
+        <p:txBody>
+          <a:bodyPr/>
+          <a:lstStyle/>
+          <a:p>
+            <a:pPr marL="0" marR="0" lvl="0" indent="0" algn="ctr" defTabSz="685800" rtl="0" eaLnBrk="1" fontAlgn="auto" latinLnBrk="0" hangingPunct="1">
+              <a:lnSpc>
+                <a:spcPct val="100000"/>
+              </a:lnSpc>
+              <a:spcBef>
+                <a:spcPts val="0"/>
+              </a:spcBef>
+              <a:spcAft>
+                <a:spcPts val="0"/>
+              </a:spcAft>
+              <a:buClrTx/>
+              <a:buSzTx/>
+              <a:buFont typeface="Arial"/>
+              <a:buNone/>
+              <a:tabLst/>
+              <a:defRPr/>
+            </a:pPr>
+            <a:fld id="{20ACEE5B-6B89-47D3-A969-11CC9D54FA43}" type="slidenum">
+              <a:rPr kumimoji="0" lang="en-US" sz="900" b="0" i="0" u="none" strike="noStrike" kern="1200" cap="none" spc="0" normalizeH="0" baseline="0" noProof="0">
+                <a:ln>
+                  <a:noFill/>
+                </a:ln>
+                <a:solidFill>
+                  <a:prstClr val="white"/>
+                </a:solidFill>
+                <a:effectLst/>
+                <a:uLnTx/>
+                <a:uFillTx/>
+                <a:latin typeface="Garamond"/>
+                <a:ea typeface="+mn-ea"/>
+                <a:cs typeface="Arial"/>
+                <a:sym typeface="Arial"/>
+              </a:rPr>
+              <a:pPr marL="0" marR="0" lvl="0" indent="0" algn="ctr" defTabSz="685800" rtl="0" eaLnBrk="1" fontAlgn="auto" latinLnBrk="0" hangingPunct="1">
+                <a:lnSpc>
+                  <a:spcPct val="100000"/>
+                </a:lnSpc>
+                <a:spcBef>
+                  <a:spcPts val="0"/>
+                </a:spcBef>
+                <a:spcAft>
+                  <a:spcPts val="0"/>
+                </a:spcAft>
+                <a:buClrTx/>
+                <a:buSzTx/>
+                <a:buFont typeface="Arial"/>
+                <a:buNone/>
+                <a:tabLst/>
+                <a:defRPr/>
+              </a:pPr>
+              <a:t>27</a:t>
+            </a:fld>
+            <a:endParaRPr kumimoji="0" lang="en-US" sz="900" b="0" i="0" u="none" strike="noStrike" kern="1200" cap="none" spc="0" normalizeH="0" baseline="0" noProof="0">
+              <a:ln>
+                <a:noFill/>
+              </a:ln>
+              <a:solidFill>
+                <a:prstClr val="white"/>
+              </a:solidFill>
+              <a:effectLst/>
+              <a:uLnTx/>
+              <a:uFillTx/>
+              <a:latin typeface="Garamond"/>
+              <a:ea typeface="+mn-ea"/>
+              <a:cs typeface="Arial"/>
+              <a:sym typeface="Arial"/>
+            </a:endParaRPr>
+          </a:p>
+        </p:txBody>
+      </p:sp>
+      <p:cxnSp>
+        <p:nvCxnSpPr>
+          <p:cNvPr id="10" name="Straight Connector 9">
+            <a:extLst>
+              <a:ext uri="{FF2B5EF4-FFF2-40B4-BE49-F238E27FC236}">
+                <a16:creationId xmlns:a16="http://schemas.microsoft.com/office/drawing/2014/main" id="{FB636B81-E366-40A1-A22C-E23DE020F5B1}"/>
+              </a:ext>
+            </a:extLst>
+          </p:cNvPr>
+          <p:cNvCxnSpPr>
+            <a:cxnSpLocks/>
+          </p:cNvCxnSpPr>
+          <p:nvPr/>
+        </p:nvCxnSpPr>
+        <p:spPr>
+          <a:xfrm>
+            <a:off x="3960253" y="4843463"/>
+            <a:ext cx="4450322" cy="0"/>
+          </a:xfrm>
+          <a:prstGeom prst="line">
+            <a:avLst/>
+          </a:prstGeom>
+          <a:ln>
+            <a:solidFill>
+              <a:schemeClr val="bg1">
+                <a:lumMod val="75000"/>
+              </a:schemeClr>
+            </a:solidFill>
+          </a:ln>
+        </p:spPr>
+        <p:style>
+          <a:lnRef idx="1">
+            <a:schemeClr val="accent1"/>
+          </a:lnRef>
+          <a:fillRef idx="0">
+            <a:schemeClr val="accent1"/>
+          </a:fillRef>
+          <a:effectRef idx="0">
+            <a:schemeClr val="accent1"/>
+          </a:effectRef>
+          <a:fontRef idx="minor">
+            <a:schemeClr val="tx1"/>
+          </a:fontRef>
+        </p:style>
+      </p:cxnSp>
+      <p:cxnSp>
+        <p:nvCxnSpPr>
+          <p:cNvPr id="9" name="Straight Connector 8">
+            <a:extLst>
+              <a:ext uri="{FF2B5EF4-FFF2-40B4-BE49-F238E27FC236}">
+                <a16:creationId xmlns:a16="http://schemas.microsoft.com/office/drawing/2014/main" id="{C7FD908F-7DBA-4437-9681-9B15B002034C}"/>
+              </a:ext>
+            </a:extLst>
+          </p:cNvPr>
+          <p:cNvCxnSpPr>
+            <a:cxnSpLocks/>
+          </p:cNvCxnSpPr>
+          <p:nvPr/>
+        </p:nvCxnSpPr>
+        <p:spPr>
+          <a:xfrm>
+            <a:off x="357188" y="935191"/>
+            <a:ext cx="3129767" cy="0"/>
+          </a:xfrm>
+          <a:prstGeom prst="line">
+            <a:avLst/>
+          </a:prstGeom>
+          <a:ln>
+            <a:solidFill>
+              <a:schemeClr val="bg1"/>
+            </a:solidFill>
+          </a:ln>
+        </p:spPr>
+        <p:style>
+          <a:lnRef idx="1">
+            <a:schemeClr val="accent1"/>
+          </a:lnRef>
+          <a:fillRef idx="0">
+            <a:schemeClr val="accent1"/>
+          </a:fillRef>
+          <a:effectRef idx="0">
+            <a:schemeClr val="accent1"/>
+          </a:effectRef>
+          <a:fontRef idx="minor">
+            <a:schemeClr val="tx1"/>
+          </a:fontRef>
+        </p:style>
+      </p:cxnSp>
+      <p:pic>
+        <p:nvPicPr>
+          <p:cNvPr id="7" name="Picture 6">
+            <a:extLst>
+              <a:ext uri="{FF2B5EF4-FFF2-40B4-BE49-F238E27FC236}">
+                <a16:creationId xmlns:a16="http://schemas.microsoft.com/office/drawing/2014/main" id="{E881246C-D515-FA37-B02A-604E39F122B1}"/>
+              </a:ext>
+            </a:extLst>
+          </p:cNvPr>
+          <p:cNvPicPr>
+            <a:picLocks noChangeAspect="1"/>
+          </p:cNvPicPr>
+          <p:nvPr/>
+        </p:nvPicPr>
+        <p:blipFill>
+          <a:blip r:embed="rId2"/>
+          <a:stretch>
+            <a:fillRect/>
+          </a:stretch>
+        </p:blipFill>
+        <p:spPr>
+          <a:xfrm>
+            <a:off x="4317442" y="377771"/>
+            <a:ext cx="4087921" cy="4087921"/>
+          </a:xfrm>
+          <a:prstGeom prst="rect">
+            <a:avLst/>
+          </a:prstGeom>
+          <a:ln>
+            <a:solidFill>
+              <a:schemeClr val="tx1"/>
+            </a:solidFill>
+          </a:ln>
+        </p:spPr>
+      </p:pic>
+    </p:spTree>
+    <p:extLst>
+      <p:ext uri="{BB962C8B-B14F-4D97-AF65-F5344CB8AC3E}">
+        <p14:creationId xmlns:p14="http://schemas.microsoft.com/office/powerpoint/2010/main" val="3293937884"/>
+      </p:ext>
+    </p:extLst>
+  </p:cSld>
+  <p:clrMapOvr>
+    <a:masterClrMapping/>
+  </p:clrMapOvr>
+</p:sld>
+</file>
+
+<file path=ppt/slides/slide28.xml><?xml version="1.0" encoding="utf-8"?>
+<p:sld xmlns:a="http://schemas.openxmlformats.org/drawingml/2006/main" xmlns:r="http://schemas.openxmlformats.org/officeDocument/2006/relationships" xmlns:p="http://schemas.openxmlformats.org/presentationml/2006/main">
+  <p:cSld>
+    <p:spTree>
+      <p:nvGrpSpPr>
         <p:cNvPr id="1" name="Shape 173"/>
         <p:cNvGrpSpPr/>
         <p:nvPr/>
@@ -33273,7 +34570,7 @@
 </p:sld>
 </file>
 
-<file path=ppt/slides/slide26.xml><?xml version="1.0" encoding="utf-8"?>
+<file path=ppt/slides/slide29.xml><?xml version="1.0" encoding="utf-8"?>
 <p:sld xmlns:a="http://schemas.openxmlformats.org/drawingml/2006/main" xmlns:r="http://schemas.openxmlformats.org/officeDocument/2006/relationships" xmlns:p="http://schemas.openxmlformats.org/presentationml/2006/main">
   <p:cSld>
     <p:spTree>
@@ -33352,6 +34649,54 @@
             <a:noAutofit/>
           </a:bodyPr>
           <a:lstStyle/>
+          <a:p>
+            <a:pPr algn="just">
+              <a:buFont typeface="+mj-lt"/>
+              <a:buAutoNum type="arabicPeriod"/>
+            </a:pPr>
+            <a:r>
+              <a:rPr lang="en-US" sz="1600" dirty="0"/>
+              <a:t>From the above facts, it can be concluded that the Beverages product category is the most profitable and highly sold product category in the Northwind database. This information can be used to inform product development and inventory management strategies, by prioritizing the production of similar products or expanding the Beverages category.</a:t>
+            </a:r>
+          </a:p>
+          <a:p>
+            <a:pPr algn="just">
+              <a:buFont typeface="+mj-lt"/>
+              <a:buAutoNum type="arabicPeriod"/>
+            </a:pPr>
+            <a:r>
+              <a:rPr lang="en-US" sz="1600" dirty="0"/>
+              <a:t>Furthermore, the high sales performance of Camembert Pierrot highlights the potential for similar products to perform well in the market. This could be used to inform product development and marketing efforts for similar products.</a:t>
+            </a:r>
+          </a:p>
+          <a:p>
+            <a:pPr algn="just">
+              <a:buFont typeface="+mj-lt"/>
+              <a:buAutoNum type="arabicPeriod"/>
+            </a:pPr>
+            <a:r>
+              <a:rPr lang="en-US" sz="1600" dirty="0"/>
+              <a:t>The majority of customers are located in the United States, which suggests that there may be potential for further growth in this market. Marketing and sales efforts could be focused on this region to target potential customers and increase sales.</a:t>
+            </a:r>
+          </a:p>
+          <a:p>
+            <a:pPr algn="just">
+              <a:buFont typeface="+mj-lt"/>
+              <a:buAutoNum type="arabicPeriod"/>
+            </a:pPr>
+            <a:r>
+              <a:rPr lang="en-US" sz="1600" dirty="0"/>
+              <a:t>Save-a-lot Markets places the most orders, which suggests that they may be a valuable target for business-to-business sales and marketing efforts. On the other hand, the low number of orders placed by </a:t>
+            </a:r>
+            <a:r>
+              <a:rPr lang="en-US" sz="1600" dirty="0" err="1"/>
+              <a:t>Frankenversand</a:t>
+            </a:r>
+            <a:r>
+              <a:rPr lang="en-US" sz="1600" dirty="0"/>
+              <a:t> highlights the potential for further growth in this market and the opportunity to target this company for increased sales.</a:t>
+            </a:r>
+          </a:p>
           <a:p>
             <a:pPr algn="just">
               <a:buFont typeface="+mj-lt"/>
@@ -33469,7 +34814,7 @@
               <a:pPr algn="ctr" defTabSz="685800">
                 <a:buClrTx/>
               </a:pPr>
-              <a:t>26</a:t>
+              <a:t>29</a:t>
             </a:fld>
             <a:endParaRPr lang="en-US" kern="1200">
               <a:solidFill>
@@ -33538,7 +34883,301 @@
 </p:sld>
 </file>
 
-<file path=ppt/slides/slide27.xml><?xml version="1.0" encoding="utf-8"?>
+<file path=ppt/slides/slide3.xml><?xml version="1.0" encoding="utf-8"?>
+<p:sld xmlns:a="http://schemas.openxmlformats.org/drawingml/2006/main" xmlns:r="http://schemas.openxmlformats.org/officeDocument/2006/relationships" xmlns:p="http://schemas.openxmlformats.org/presentationml/2006/main">
+  <p:cSld>
+    <p:spTree>
+      <p:nvGrpSpPr>
+        <p:cNvPr id="1" name="Shape 173"/>
+        <p:cNvGrpSpPr/>
+        <p:nvPr/>
+      </p:nvGrpSpPr>
+      <p:grpSpPr>
+        <a:xfrm>
+          <a:off x="0" y="0"/>
+          <a:ext cx="0" cy="0"/>
+          <a:chOff x="0" y="0"/>
+          <a:chExt cx="0" cy="0"/>
+        </a:xfrm>
+      </p:grpSpPr>
+      <p:sp>
+        <p:nvSpPr>
+          <p:cNvPr id="174" name="Google Shape;174;p27"/>
+          <p:cNvSpPr/>
+          <p:nvPr/>
+        </p:nvSpPr>
+        <p:spPr>
+          <a:xfrm>
+            <a:off x="0" y="3028951"/>
+            <a:ext cx="641554" cy="1571622"/>
+          </a:xfrm>
+          <a:prstGeom prst="rect">
+            <a:avLst/>
+          </a:prstGeom>
+          <a:solidFill>
+            <a:srgbClr val="102747"/>
+          </a:solidFill>
+          <a:ln>
+            <a:noFill/>
+          </a:ln>
+        </p:spPr>
+        <p:txBody>
+          <a:bodyPr spcFirstLastPara="1" wrap="square" lIns="68575" tIns="34275" rIns="68575" bIns="34275" anchor="ctr" anchorCtr="0">
+            <a:noAutofit/>
+          </a:bodyPr>
+          <a:lstStyle/>
+          <a:p>
+            <a:pPr marL="0" marR="0" lvl="0" indent="0" algn="ctr" rtl="0">
+              <a:lnSpc>
+                <a:spcPct val="100000"/>
+              </a:lnSpc>
+              <a:spcBef>
+                <a:spcPts val="0"/>
+              </a:spcBef>
+              <a:spcAft>
+                <a:spcPts val="0"/>
+              </a:spcAft>
+              <a:buClr>
+                <a:schemeClr val="lt1"/>
+              </a:buClr>
+              <a:buSzPts val="1400"/>
+              <a:buFont typeface="Garamond"/>
+              <a:buNone/>
+            </a:pPr>
+            <a:endParaRPr sz="1400" b="0" i="0" u="none" strike="noStrike" cap="none">
+              <a:solidFill>
+                <a:srgbClr val="FFFFFF"/>
+              </a:solidFill>
+              <a:latin typeface="Garamond"/>
+              <a:ea typeface="Garamond"/>
+              <a:cs typeface="Garamond"/>
+              <a:sym typeface="Garamond"/>
+            </a:endParaRPr>
+          </a:p>
+        </p:txBody>
+      </p:sp>
+      <p:grpSp>
+        <p:nvGrpSpPr>
+          <p:cNvPr id="175" name="Google Shape;175;p27"/>
+          <p:cNvGrpSpPr/>
+          <p:nvPr/>
+        </p:nvGrpSpPr>
+        <p:grpSpPr>
+          <a:xfrm>
+            <a:off x="973157" y="3338688"/>
+            <a:ext cx="6047569" cy="1029093"/>
+            <a:chOff x="810520" y="2694643"/>
+            <a:chExt cx="8063425" cy="1372123"/>
+          </a:xfrm>
+        </p:grpSpPr>
+        <p:sp>
+          <p:nvSpPr>
+            <p:cNvPr id="176" name="Google Shape;176;p27"/>
+            <p:cNvSpPr txBox="1"/>
+            <p:nvPr/>
+          </p:nvSpPr>
+          <p:spPr>
+            <a:xfrm>
+              <a:off x="810520" y="2694643"/>
+              <a:ext cx="8063425" cy="738663"/>
+            </a:xfrm>
+            <a:prstGeom prst="rect">
+              <a:avLst/>
+            </a:prstGeom>
+            <a:noFill/>
+            <a:ln>
+              <a:noFill/>
+            </a:ln>
+          </p:spPr>
+          <p:txBody>
+            <a:bodyPr spcFirstLastPara="1" wrap="square" lIns="0" tIns="0" rIns="0" bIns="0" anchor="b" anchorCtr="0">
+              <a:spAutoFit/>
+            </a:bodyPr>
+            <a:lstStyle/>
+            <a:p>
+              <a:pPr marL="0" marR="0" lvl="0" indent="0" algn="l" rtl="0">
+                <a:lnSpc>
+                  <a:spcPct val="100000"/>
+                </a:lnSpc>
+                <a:spcBef>
+                  <a:spcPts val="0"/>
+                </a:spcBef>
+                <a:spcAft>
+                  <a:spcPts val="0"/>
+                </a:spcAft>
+                <a:buClr>
+                  <a:srgbClr val="102747"/>
+                </a:buClr>
+                <a:buSzPts val="4500"/>
+                <a:buFont typeface="Garamond"/>
+                <a:buNone/>
+              </a:pPr>
+              <a:r>
+                <a:rPr lang="en" sz="3600" b="0" i="0" u="none" strike="noStrike" cap="none" dirty="0">
+                  <a:solidFill>
+                    <a:srgbClr val="102747"/>
+                  </a:solidFill>
+                  <a:latin typeface="Garamond"/>
+                  <a:ea typeface="Garamond"/>
+                  <a:cs typeface="Garamond"/>
+                  <a:sym typeface="Garamond"/>
+                </a:rPr>
+                <a:t>Business &amp; Data Understanding</a:t>
+              </a:r>
+              <a:endParaRPr sz="3600" dirty="0"/>
+            </a:p>
+          </p:txBody>
+        </p:sp>
+        <p:sp>
+          <p:nvSpPr>
+            <p:cNvPr id="177" name="Google Shape;177;p27"/>
+            <p:cNvSpPr txBox="1"/>
+            <p:nvPr/>
+          </p:nvSpPr>
+          <p:spPr>
+            <a:xfrm>
+              <a:off x="810520" y="3717953"/>
+              <a:ext cx="8063425" cy="348813"/>
+            </a:xfrm>
+            <a:prstGeom prst="rect">
+              <a:avLst/>
+            </a:prstGeom>
+            <a:noFill/>
+            <a:ln>
+              <a:noFill/>
+            </a:ln>
+          </p:spPr>
+          <p:txBody>
+            <a:bodyPr spcFirstLastPara="1" wrap="square" lIns="0" tIns="0" rIns="0" bIns="0" anchor="t" anchorCtr="0">
+              <a:spAutoFit/>
+            </a:bodyPr>
+            <a:lstStyle/>
+            <a:p>
+              <a:pPr marL="0" marR="0" lvl="0" indent="0" algn="l" rtl="0">
+                <a:lnSpc>
+                  <a:spcPct val="100000"/>
+                </a:lnSpc>
+                <a:spcBef>
+                  <a:spcPts val="0"/>
+                </a:spcBef>
+                <a:spcAft>
+                  <a:spcPts val="0"/>
+                </a:spcAft>
+                <a:buClr>
+                  <a:srgbClr val="102747"/>
+                </a:buClr>
+                <a:buSzPts val="1700"/>
+                <a:buFont typeface="Garamond"/>
+                <a:buNone/>
+              </a:pPr>
+              <a:r>
+                <a:rPr lang="en" sz="1700" b="1" i="0" u="none" strike="noStrike" cap="none" dirty="0">
+                  <a:solidFill>
+                    <a:srgbClr val="102747"/>
+                  </a:solidFill>
+                  <a:latin typeface="Garamond"/>
+                  <a:ea typeface="Garamond"/>
+                  <a:cs typeface="Garamond"/>
+                  <a:sym typeface="Garamond"/>
+                </a:rPr>
+                <a:t>Northwind Traders</a:t>
+              </a:r>
+              <a:endParaRPr sz="1100" dirty="0"/>
+            </a:p>
+          </p:txBody>
+        </p:sp>
+        <p:cxnSp>
+          <p:nvCxnSpPr>
+            <p:cNvPr id="178" name="Google Shape;178;p27"/>
+            <p:cNvCxnSpPr/>
+            <p:nvPr/>
+          </p:nvCxnSpPr>
+          <p:spPr>
+            <a:xfrm>
+              <a:off x="810520" y="3575631"/>
+              <a:ext cx="8063425" cy="0"/>
+            </a:xfrm>
+            <a:prstGeom prst="straightConnector1">
+              <a:avLst/>
+            </a:prstGeom>
+            <a:noFill/>
+            <a:ln w="9525" cap="flat" cmpd="sng">
+              <a:solidFill>
+                <a:srgbClr val="BFBFBF"/>
+              </a:solidFill>
+              <a:prstDash val="solid"/>
+              <a:miter lim="800000"/>
+              <a:headEnd type="none" w="sm" len="sm"/>
+              <a:tailEnd type="none" w="sm" len="sm"/>
+            </a:ln>
+          </p:spPr>
+        </p:cxnSp>
+      </p:grpSp>
+      <p:sp>
+        <p:nvSpPr>
+          <p:cNvPr id="179" name="Google Shape;179;p27"/>
+          <p:cNvSpPr/>
+          <p:nvPr/>
+        </p:nvSpPr>
+        <p:spPr>
+          <a:xfrm>
+            <a:off x="7352327" y="3028951"/>
+            <a:ext cx="1791673" cy="1571622"/>
+          </a:xfrm>
+          <a:prstGeom prst="rect">
+            <a:avLst/>
+          </a:prstGeom>
+          <a:solidFill>
+            <a:srgbClr val="102747"/>
+          </a:solidFill>
+          <a:ln>
+            <a:noFill/>
+          </a:ln>
+        </p:spPr>
+        <p:txBody>
+          <a:bodyPr spcFirstLastPara="1" wrap="square" lIns="68575" tIns="34275" rIns="68575" bIns="34275" anchor="ctr" anchorCtr="0">
+            <a:noAutofit/>
+          </a:bodyPr>
+          <a:lstStyle/>
+          <a:p>
+            <a:pPr marL="0" marR="0" lvl="0" indent="0" algn="ctr" rtl="0">
+              <a:lnSpc>
+                <a:spcPct val="100000"/>
+              </a:lnSpc>
+              <a:spcBef>
+                <a:spcPts val="0"/>
+              </a:spcBef>
+              <a:spcAft>
+                <a:spcPts val="0"/>
+              </a:spcAft>
+              <a:buClr>
+                <a:schemeClr val="lt1"/>
+              </a:buClr>
+              <a:buSzPts val="1400"/>
+              <a:buFont typeface="Garamond"/>
+              <a:buNone/>
+            </a:pPr>
+            <a:endParaRPr sz="1400" b="0" i="0" u="none" strike="noStrike" cap="none">
+              <a:solidFill>
+                <a:srgbClr val="FFFFFF"/>
+              </a:solidFill>
+              <a:latin typeface="Garamond"/>
+              <a:ea typeface="Garamond"/>
+              <a:cs typeface="Garamond"/>
+              <a:sym typeface="Garamond"/>
+            </a:endParaRPr>
+          </a:p>
+        </p:txBody>
+      </p:sp>
+    </p:spTree>
+  </p:cSld>
+  <p:clrMapOvr>
+    <a:masterClrMapping/>
+  </p:clrMapOvr>
+</p:sld>
+</file>
+
+<file path=ppt/slides/slide30.xml><?xml version="1.0" encoding="utf-8"?>
 <p:sld xmlns:a="http://schemas.openxmlformats.org/drawingml/2006/main" xmlns:r="http://schemas.openxmlformats.org/officeDocument/2006/relationships" xmlns:p="http://schemas.openxmlformats.org/presentationml/2006/main">
   <p:cSld>
     <p:spTree>
@@ -33599,7 +35238,7 @@
               <a:pPr algn="ctr" defTabSz="685800">
                 <a:buClrTx/>
               </a:pPr>
-              <a:t>27</a:t>
+              <a:t>30</a:t>
             </a:fld>
             <a:endParaRPr lang="en-US" kern="1200">
               <a:solidFill>
@@ -40307,300 +41946,6 @@
 </p:sld>
 </file>
 
-<file path=ppt/slides/slide3.xml><?xml version="1.0" encoding="utf-8"?>
-<p:sld xmlns:a="http://schemas.openxmlformats.org/drawingml/2006/main" xmlns:r="http://schemas.openxmlformats.org/officeDocument/2006/relationships" xmlns:p="http://schemas.openxmlformats.org/presentationml/2006/main">
-  <p:cSld>
-    <p:spTree>
-      <p:nvGrpSpPr>
-        <p:cNvPr id="1" name="Shape 173"/>
-        <p:cNvGrpSpPr/>
-        <p:nvPr/>
-      </p:nvGrpSpPr>
-      <p:grpSpPr>
-        <a:xfrm>
-          <a:off x="0" y="0"/>
-          <a:ext cx="0" cy="0"/>
-          <a:chOff x="0" y="0"/>
-          <a:chExt cx="0" cy="0"/>
-        </a:xfrm>
-      </p:grpSpPr>
-      <p:sp>
-        <p:nvSpPr>
-          <p:cNvPr id="174" name="Google Shape;174;p27"/>
-          <p:cNvSpPr/>
-          <p:nvPr/>
-        </p:nvSpPr>
-        <p:spPr>
-          <a:xfrm>
-            <a:off x="0" y="3028951"/>
-            <a:ext cx="641554" cy="1571622"/>
-          </a:xfrm>
-          <a:prstGeom prst="rect">
-            <a:avLst/>
-          </a:prstGeom>
-          <a:solidFill>
-            <a:srgbClr val="102747"/>
-          </a:solidFill>
-          <a:ln>
-            <a:noFill/>
-          </a:ln>
-        </p:spPr>
-        <p:txBody>
-          <a:bodyPr spcFirstLastPara="1" wrap="square" lIns="68575" tIns="34275" rIns="68575" bIns="34275" anchor="ctr" anchorCtr="0">
-            <a:noAutofit/>
-          </a:bodyPr>
-          <a:lstStyle/>
-          <a:p>
-            <a:pPr marL="0" marR="0" lvl="0" indent="0" algn="ctr" rtl="0">
-              <a:lnSpc>
-                <a:spcPct val="100000"/>
-              </a:lnSpc>
-              <a:spcBef>
-                <a:spcPts val="0"/>
-              </a:spcBef>
-              <a:spcAft>
-                <a:spcPts val="0"/>
-              </a:spcAft>
-              <a:buClr>
-                <a:schemeClr val="lt1"/>
-              </a:buClr>
-              <a:buSzPts val="1400"/>
-              <a:buFont typeface="Garamond"/>
-              <a:buNone/>
-            </a:pPr>
-            <a:endParaRPr sz="1400" b="0" i="0" u="none" strike="noStrike" cap="none">
-              <a:solidFill>
-                <a:srgbClr val="FFFFFF"/>
-              </a:solidFill>
-              <a:latin typeface="Garamond"/>
-              <a:ea typeface="Garamond"/>
-              <a:cs typeface="Garamond"/>
-              <a:sym typeface="Garamond"/>
-            </a:endParaRPr>
-          </a:p>
-        </p:txBody>
-      </p:sp>
-      <p:grpSp>
-        <p:nvGrpSpPr>
-          <p:cNvPr id="175" name="Google Shape;175;p27"/>
-          <p:cNvGrpSpPr/>
-          <p:nvPr/>
-        </p:nvGrpSpPr>
-        <p:grpSpPr>
-          <a:xfrm>
-            <a:off x="973157" y="3338688"/>
-            <a:ext cx="6047569" cy="1029093"/>
-            <a:chOff x="810520" y="2694643"/>
-            <a:chExt cx="8063425" cy="1372123"/>
-          </a:xfrm>
-        </p:grpSpPr>
-        <p:sp>
-          <p:nvSpPr>
-            <p:cNvPr id="176" name="Google Shape;176;p27"/>
-            <p:cNvSpPr txBox="1"/>
-            <p:nvPr/>
-          </p:nvSpPr>
-          <p:spPr>
-            <a:xfrm>
-              <a:off x="810520" y="2694643"/>
-              <a:ext cx="8063425" cy="738663"/>
-            </a:xfrm>
-            <a:prstGeom prst="rect">
-              <a:avLst/>
-            </a:prstGeom>
-            <a:noFill/>
-            <a:ln>
-              <a:noFill/>
-            </a:ln>
-          </p:spPr>
-          <p:txBody>
-            <a:bodyPr spcFirstLastPara="1" wrap="square" lIns="0" tIns="0" rIns="0" bIns="0" anchor="b" anchorCtr="0">
-              <a:spAutoFit/>
-            </a:bodyPr>
-            <a:lstStyle/>
-            <a:p>
-              <a:pPr marL="0" marR="0" lvl="0" indent="0" algn="l" rtl="0">
-                <a:lnSpc>
-                  <a:spcPct val="100000"/>
-                </a:lnSpc>
-                <a:spcBef>
-                  <a:spcPts val="0"/>
-                </a:spcBef>
-                <a:spcAft>
-                  <a:spcPts val="0"/>
-                </a:spcAft>
-                <a:buClr>
-                  <a:srgbClr val="102747"/>
-                </a:buClr>
-                <a:buSzPts val="4500"/>
-                <a:buFont typeface="Garamond"/>
-                <a:buNone/>
-              </a:pPr>
-              <a:r>
-                <a:rPr lang="en" sz="3600" b="0" i="0" u="none" strike="noStrike" cap="none" dirty="0">
-                  <a:solidFill>
-                    <a:srgbClr val="102747"/>
-                  </a:solidFill>
-                  <a:latin typeface="Garamond"/>
-                  <a:ea typeface="Garamond"/>
-                  <a:cs typeface="Garamond"/>
-                  <a:sym typeface="Garamond"/>
-                </a:rPr>
-                <a:t>Business &amp; Data Understanding</a:t>
-              </a:r>
-              <a:endParaRPr sz="3600" dirty="0"/>
-            </a:p>
-          </p:txBody>
-        </p:sp>
-        <p:sp>
-          <p:nvSpPr>
-            <p:cNvPr id="177" name="Google Shape;177;p27"/>
-            <p:cNvSpPr txBox="1"/>
-            <p:nvPr/>
-          </p:nvSpPr>
-          <p:spPr>
-            <a:xfrm>
-              <a:off x="810520" y="3717953"/>
-              <a:ext cx="8063425" cy="348813"/>
-            </a:xfrm>
-            <a:prstGeom prst="rect">
-              <a:avLst/>
-            </a:prstGeom>
-            <a:noFill/>
-            <a:ln>
-              <a:noFill/>
-            </a:ln>
-          </p:spPr>
-          <p:txBody>
-            <a:bodyPr spcFirstLastPara="1" wrap="square" lIns="0" tIns="0" rIns="0" bIns="0" anchor="t" anchorCtr="0">
-              <a:spAutoFit/>
-            </a:bodyPr>
-            <a:lstStyle/>
-            <a:p>
-              <a:pPr marL="0" marR="0" lvl="0" indent="0" algn="l" rtl="0">
-                <a:lnSpc>
-                  <a:spcPct val="100000"/>
-                </a:lnSpc>
-                <a:spcBef>
-                  <a:spcPts val="0"/>
-                </a:spcBef>
-                <a:spcAft>
-                  <a:spcPts val="0"/>
-                </a:spcAft>
-                <a:buClr>
-                  <a:srgbClr val="102747"/>
-                </a:buClr>
-                <a:buSzPts val="1700"/>
-                <a:buFont typeface="Garamond"/>
-                <a:buNone/>
-              </a:pPr>
-              <a:r>
-                <a:rPr lang="en" sz="1700" b="1" i="0" u="none" strike="noStrike" cap="none" dirty="0">
-                  <a:solidFill>
-                    <a:srgbClr val="102747"/>
-                  </a:solidFill>
-                  <a:latin typeface="Garamond"/>
-                  <a:ea typeface="Garamond"/>
-                  <a:cs typeface="Garamond"/>
-                  <a:sym typeface="Garamond"/>
-                </a:rPr>
-                <a:t>Northwind Traders</a:t>
-              </a:r>
-              <a:endParaRPr sz="1100" dirty="0"/>
-            </a:p>
-          </p:txBody>
-        </p:sp>
-        <p:cxnSp>
-          <p:nvCxnSpPr>
-            <p:cNvPr id="178" name="Google Shape;178;p27"/>
-            <p:cNvCxnSpPr/>
-            <p:nvPr/>
-          </p:nvCxnSpPr>
-          <p:spPr>
-            <a:xfrm>
-              <a:off x="810520" y="3575631"/>
-              <a:ext cx="8063425" cy="0"/>
-            </a:xfrm>
-            <a:prstGeom prst="straightConnector1">
-              <a:avLst/>
-            </a:prstGeom>
-            <a:noFill/>
-            <a:ln w="9525" cap="flat" cmpd="sng">
-              <a:solidFill>
-                <a:srgbClr val="BFBFBF"/>
-              </a:solidFill>
-              <a:prstDash val="solid"/>
-              <a:miter lim="800000"/>
-              <a:headEnd type="none" w="sm" len="sm"/>
-              <a:tailEnd type="none" w="sm" len="sm"/>
-            </a:ln>
-          </p:spPr>
-        </p:cxnSp>
-      </p:grpSp>
-      <p:sp>
-        <p:nvSpPr>
-          <p:cNvPr id="179" name="Google Shape;179;p27"/>
-          <p:cNvSpPr/>
-          <p:nvPr/>
-        </p:nvSpPr>
-        <p:spPr>
-          <a:xfrm>
-            <a:off x="7352327" y="3028951"/>
-            <a:ext cx="1791673" cy="1571622"/>
-          </a:xfrm>
-          <a:prstGeom prst="rect">
-            <a:avLst/>
-          </a:prstGeom>
-          <a:solidFill>
-            <a:srgbClr val="102747"/>
-          </a:solidFill>
-          <a:ln>
-            <a:noFill/>
-          </a:ln>
-        </p:spPr>
-        <p:txBody>
-          <a:bodyPr spcFirstLastPara="1" wrap="square" lIns="68575" tIns="34275" rIns="68575" bIns="34275" anchor="ctr" anchorCtr="0">
-            <a:noAutofit/>
-          </a:bodyPr>
-          <a:lstStyle/>
-          <a:p>
-            <a:pPr marL="0" marR="0" lvl="0" indent="0" algn="ctr" rtl="0">
-              <a:lnSpc>
-                <a:spcPct val="100000"/>
-              </a:lnSpc>
-              <a:spcBef>
-                <a:spcPts val="0"/>
-              </a:spcBef>
-              <a:spcAft>
-                <a:spcPts val="0"/>
-              </a:spcAft>
-              <a:buClr>
-                <a:schemeClr val="lt1"/>
-              </a:buClr>
-              <a:buSzPts val="1400"/>
-              <a:buFont typeface="Garamond"/>
-              <a:buNone/>
-            </a:pPr>
-            <a:endParaRPr sz="1400" b="0" i="0" u="none" strike="noStrike" cap="none">
-              <a:solidFill>
-                <a:srgbClr val="FFFFFF"/>
-              </a:solidFill>
-              <a:latin typeface="Garamond"/>
-              <a:ea typeface="Garamond"/>
-              <a:cs typeface="Garamond"/>
-              <a:sym typeface="Garamond"/>
-            </a:endParaRPr>
-          </a:p>
-        </p:txBody>
-      </p:sp>
-    </p:spTree>
-  </p:cSld>
-  <p:clrMapOvr>
-    <a:masterClrMapping/>
-  </p:clrMapOvr>
-</p:sld>
-</file>
-
 <file path=ppt/slides/slide4.xml><?xml version="1.0" encoding="utf-8"?>
 <p:sld xmlns:a="http://schemas.openxmlformats.org/drawingml/2006/main" xmlns:r="http://schemas.openxmlformats.org/officeDocument/2006/relationships" xmlns:p="http://schemas.openxmlformats.org/presentationml/2006/main">
   <p:cSld>

</xml_diff>